<commit_message>
Slides for session 10
Discussion on Examples
</commit_message>
<xml_diff>
--- a/Session 9.pptx
+++ b/Session 9.pptx
@@ -3721,13 +3721,13 @@
             <a:pPr lvl="1"/>
             <a:r>
               <a:rPr lang="en-US" dirty="0"/>
-              <a:t>Canonical schema (JSON + CDDL)</a:t>
+              <a:t>Canonical schema (JSON + CDDL) Framework Schema</a:t>
             </a:r>
           </a:p>
           <a:p>
             <a:pPr lvl="1"/>
             <a:r>
-              <a:rPr lang="en-US" dirty="0"/>
+              <a:rPr lang="en-US" strike="sngStrike" dirty="0"/>
               <a:t>Canonical Document</a:t>
             </a:r>
           </a:p>
@@ -3735,13 +3735,13 @@
             <a:pPr lvl="1"/>
             <a:r>
               <a:rPr lang="en-US" dirty="0"/>
-              <a:t>Alt Schema (JSON + CDDL)</a:t>
+              <a:t>Alt Schema (JSON + CDDL) – Need to Merge</a:t>
             </a:r>
           </a:p>
           <a:p>
             <a:pPr lvl="1"/>
             <a:r>
-              <a:rPr lang="en-US" dirty="0"/>
+              <a:rPr lang="en-US" strike="sngStrike" dirty="0"/>
               <a:t>Alt Document</a:t>
             </a:r>
           </a:p>
@@ -3749,7 +3749,7 @@
             <a:pPr lvl="1"/>
             <a:r>
               <a:rPr lang="en-US" dirty="0"/>
-              <a:t>I-D in progress</a:t>
+              <a:t>I-D in progress – stable (IETF) + dev branches</a:t>
             </a:r>
           </a:p>
         </p:txBody>
@@ -4136,7 +4136,7 @@
           <a:p>
             <a:r>
               <a:rPr lang="en-US" dirty="0"/>
-              <a:t>Nice Models, People can use, Both Schemas</a:t>
+              <a:t>Nice Models, People can use, Both Syntax</a:t>
             </a:r>
           </a:p>
         </p:txBody>
@@ -4171,7 +4171,7 @@
           <a:p>
             <a:r>
               <a:rPr lang="en-US" dirty="0"/>
-              <a:t>Contract not to break compatibility, strict schema</a:t>
+              <a:t>Contract not to break compatibility, validation syntax</a:t>
             </a:r>
           </a:p>
         </p:txBody>
@@ -4206,7 +4206,7 @@
           <a:p>
             <a:r>
               <a:rPr lang="en-US" dirty="0"/>
-              <a:t>Canonical Schemas</a:t>
+              <a:t>Framework Syntax ++</a:t>
             </a:r>
           </a:p>
         </p:txBody>

</xml_diff>